<commit_message>
finalize PPT and do preliminary organization of 001 and 002
</commit_message>
<xml_diff>
--- a/Customer-Segmentation-Presentation.pptx
+++ b/Customer-Segmentation-Presentation.pptx
@@ -5,7 +5,7 @@
     <p:sldMasterId id="2147483648" r:id="rId1"/>
   </p:sldMasterIdLst>
   <p:notesMasterIdLst>
-    <p:notesMasterId r:id="rId34"/>
+    <p:notesMasterId r:id="rId33"/>
   </p:notesMasterIdLst>
   <p:sldIdLst>
     <p:sldId id="258" r:id="rId2"/>
@@ -36,10 +36,9 @@
     <p:sldId id="313" r:id="rId27"/>
     <p:sldId id="314" r:id="rId28"/>
     <p:sldId id="317" r:id="rId29"/>
-    <p:sldId id="319" r:id="rId30"/>
-    <p:sldId id="294" r:id="rId31"/>
-    <p:sldId id="321" r:id="rId32"/>
-    <p:sldId id="297" r:id="rId33"/>
+    <p:sldId id="294" r:id="rId30"/>
+    <p:sldId id="321" r:id="rId31"/>
+    <p:sldId id="297" r:id="rId32"/>
   </p:sldIdLst>
   <p:sldSz cx="12192000" cy="6858000"/>
   <p:notesSz cx="6858000" cy="9144000"/>
@@ -11799,7 +11798,7 @@
           <p:cNvPr id="2" name="Title 1">
             <a:extLst>
               <a:ext uri="{FF2B5EF4-FFF2-40B4-BE49-F238E27FC236}">
-                <a16:creationId xmlns:a16="http://schemas.microsoft.com/office/drawing/2014/main" id="{A61CCEFB-13A0-C238-A3BA-1C2FB497E967}"/>
+                <a16:creationId xmlns:a16="http://schemas.microsoft.com/office/drawing/2014/main" id="{2219958F-55A5-8230-D0F0-C1C5A2EA48F4}"/>
               </a:ext>
             </a:extLst>
           </p:cNvPr>
@@ -11817,7 +11816,7 @@
           <a:p>
             <a:r>
               <a:rPr lang="en-US" dirty="0"/>
-              <a:t>Cluster characteristics summary</a:t>
+              <a:t>Summary of findings</a:t>
             </a:r>
           </a:p>
         </p:txBody>
@@ -11827,7 +11826,7 @@
           <p:cNvPr id="3" name="Content Placeholder 2">
             <a:extLst>
               <a:ext uri="{FF2B5EF4-FFF2-40B4-BE49-F238E27FC236}">
-                <a16:creationId xmlns:a16="http://schemas.microsoft.com/office/drawing/2014/main" id="{39390ED6-5B25-F83D-02FC-685B425DCF1C}"/>
+                <a16:creationId xmlns:a16="http://schemas.microsoft.com/office/drawing/2014/main" id="{0CF5FD2C-87D9-9295-2774-E99BFB637AED}"/>
               </a:ext>
             </a:extLst>
           </p:cNvPr>
@@ -11840,47 +11839,80 @@
         </p:nvSpPr>
         <p:spPr>
           <a:xfrm>
-            <a:off x="581192" y="2180496"/>
-            <a:ext cx="11029615" cy="4111122"/>
-          </a:xfrm>
-        </p:spPr>
-        <p:txBody>
-          <a:bodyPr/>
+            <a:off x="581193" y="2477541"/>
+            <a:ext cx="11029615" cy="3678303"/>
+          </a:xfrm>
+        </p:spPr>
+        <p:txBody>
+          <a:bodyPr>
+            <a:normAutofit fontScale="25000" lnSpcReduction="20000"/>
+          </a:bodyPr>
           <a:lstStyle/>
           <a:p>
-            <a:r>
-              <a:rPr lang="en-US" sz="2000" i="1" dirty="0"/>
-              <a:t>Target deals at </a:t>
-            </a:r>
-            <a:r>
-              <a:rPr lang="en-US" sz="2000" dirty="0"/>
-              <a:t>Clusters 2-4 </a:t>
-            </a:r>
-          </a:p>
-          <a:p>
-            <a:r>
-              <a:rPr lang="en-US" sz="2000" i="1" dirty="0"/>
+            <a:endParaRPr lang="en-US" i="1" dirty="0"/>
+          </a:p>
+          <a:p>
+            <a:endParaRPr lang="en-US" i="1" dirty="0"/>
+          </a:p>
+          <a:p>
+            <a:endParaRPr lang="en-US" sz="9600" i="1" dirty="0"/>
+          </a:p>
+          <a:p>
+            <a:r>
+              <a:rPr lang="en-US" sz="9600" dirty="0"/>
+              <a:t>If run deals, target these at Clusters 2-4 </a:t>
+            </a:r>
+          </a:p>
+          <a:p>
+            <a:r>
+              <a:rPr lang="en-US" sz="9600" dirty="0"/>
               <a:t>Concentrate on making/keeping the web page appealing for Clusters 0, 1, and 5</a:t>
             </a:r>
           </a:p>
           <a:p>
             <a:r>
-              <a:rPr lang="en-US" sz="2000" i="1" dirty="0"/>
+              <a:rPr lang="en-US" sz="9600" dirty="0"/>
               <a:t>Make sure to have a polished catalog, especially for Cluster 5 customers, who could bring in the most revenue in the future</a:t>
             </a:r>
           </a:p>
           <a:p>
             <a:r>
-              <a:rPr lang="en-US" sz="2000" i="1" dirty="0"/>
+              <a:rPr lang="en-US" sz="9600" dirty="0"/>
               <a:t>Make customers’ in-store experience customers pleasant as high-spending clusters seem to value it</a:t>
             </a:r>
           </a:p>
           <a:p>
             <a:r>
-              <a:rPr lang="en-US" sz="2000" i="1" dirty="0"/>
+              <a:rPr lang="en-US" sz="9600" dirty="0"/>
+              <a:t>Learn from Campaign 2 in order to not repeat it</a:t>
+            </a:r>
+          </a:p>
+          <a:p>
+            <a:r>
+              <a:rPr lang="en-US" sz="9600" dirty="0"/>
               <a:t>Concentrate on running and improving campaigns like Campaign1 and 5, as these attract the high-spending customers</a:t>
             </a:r>
-            <a:endParaRPr lang="en-US" dirty="0"/>
+          </a:p>
+          <a:p>
+            <a:r>
+              <a:rPr lang="en-US" sz="9600" dirty="0"/>
+              <a:t>Concentrate on identifying and attracting customers like Cluster 5 for highest future expected revenue</a:t>
+            </a:r>
+          </a:p>
+          <a:p>
+            <a:pPr marL="0" indent="0">
+              <a:buNone/>
+            </a:pPr>
+            <a:endParaRPr lang="en-US" sz="9600" i="1" dirty="0"/>
+          </a:p>
+          <a:p>
+            <a:endParaRPr lang="en-US" i="1" dirty="0"/>
+          </a:p>
+          <a:p>
+            <a:endParaRPr lang="en-US" i="1" dirty="0"/>
+          </a:p>
+          <a:p>
+            <a:endParaRPr lang="en-US" i="1" dirty="0"/>
           </a:p>
           <a:p>
             <a:endParaRPr lang="en-US" dirty="0"/>
@@ -11890,7 +11922,7 @@
     </p:spTree>
     <p:extLst>
       <p:ext uri="{BB962C8B-B14F-4D97-AF65-F5344CB8AC3E}">
-        <p14:creationId xmlns:p14="http://schemas.microsoft.com/office/powerpoint/2010/main" val="2797040362"/>
+        <p14:creationId xmlns:p14="http://schemas.microsoft.com/office/powerpoint/2010/main" val="4108084837"/>
       </p:ext>
     </p:extLst>
   </p:cSld>
@@ -12061,162 +12093,6 @@
           <a:p>
             <a:r>
               <a:rPr lang="en-US" dirty="0"/>
-              <a:t>Summary of findings</a:t>
-            </a:r>
-          </a:p>
-        </p:txBody>
-      </p:sp>
-      <p:sp>
-        <p:nvSpPr>
-          <p:cNvPr id="3" name="Content Placeholder 2">
-            <a:extLst>
-              <a:ext uri="{FF2B5EF4-FFF2-40B4-BE49-F238E27FC236}">
-                <a16:creationId xmlns:a16="http://schemas.microsoft.com/office/drawing/2014/main" id="{0CF5FD2C-87D9-9295-2774-E99BFB637AED}"/>
-              </a:ext>
-            </a:extLst>
-          </p:cNvPr>
-          <p:cNvSpPr>
-            <a:spLocks noGrp="1"/>
-          </p:cNvSpPr>
-          <p:nvPr>
-            <p:ph idx="1"/>
-          </p:nvPr>
-        </p:nvSpPr>
-        <p:spPr>
-          <a:xfrm>
-            <a:off x="581193" y="2477541"/>
-            <a:ext cx="11029615" cy="3678303"/>
-          </a:xfrm>
-        </p:spPr>
-        <p:txBody>
-          <a:bodyPr>
-            <a:normAutofit fontScale="25000" lnSpcReduction="20000"/>
-          </a:bodyPr>
-          <a:lstStyle/>
-          <a:p>
-            <a:endParaRPr lang="en-US" i="1" dirty="0"/>
-          </a:p>
-          <a:p>
-            <a:endParaRPr lang="en-US" i="1" dirty="0"/>
-          </a:p>
-          <a:p>
-            <a:endParaRPr lang="en-US" sz="9600" i="1" dirty="0"/>
-          </a:p>
-          <a:p>
-            <a:r>
-              <a:rPr lang="en-US" sz="9600" dirty="0"/>
-              <a:t>If run deals, target these at Clusters 2-4 </a:t>
-            </a:r>
-          </a:p>
-          <a:p>
-            <a:r>
-              <a:rPr lang="en-US" sz="9600" dirty="0"/>
-              <a:t>Concentrate on making/keeping the web page appealing for Clusters 0, 1, and 5</a:t>
-            </a:r>
-          </a:p>
-          <a:p>
-            <a:r>
-              <a:rPr lang="en-US" sz="9600" dirty="0"/>
-              <a:t>Make sure to have a polished catalog, especially for Cluster 5 customers, who could bring in the most revenue in the future</a:t>
-            </a:r>
-          </a:p>
-          <a:p>
-            <a:r>
-              <a:rPr lang="en-US" sz="9600" dirty="0"/>
-              <a:t>Make customers’ in-store experience customers pleasant as high-spending clusters seem to value it</a:t>
-            </a:r>
-          </a:p>
-          <a:p>
-            <a:r>
-              <a:rPr lang="en-US" sz="9600" dirty="0"/>
-              <a:t>Learn from Campaign 2 in order to not repeat it</a:t>
-            </a:r>
-          </a:p>
-          <a:p>
-            <a:r>
-              <a:rPr lang="en-US" sz="9600" dirty="0"/>
-              <a:t>Concentrate on running and improving campaigns like Campaign1 and 5, as these attract the high-spending customers</a:t>
-            </a:r>
-          </a:p>
-          <a:p>
-            <a:r>
-              <a:rPr lang="en-US" sz="9600" dirty="0"/>
-              <a:t>Concentrate on identifying and attracting customers like Cluster 5 for highest future expected revenue</a:t>
-            </a:r>
-          </a:p>
-          <a:p>
-            <a:pPr marL="0" indent="0">
-              <a:buNone/>
-            </a:pPr>
-            <a:endParaRPr lang="en-US" sz="9600" i="1" dirty="0"/>
-          </a:p>
-          <a:p>
-            <a:endParaRPr lang="en-US" i="1" dirty="0"/>
-          </a:p>
-          <a:p>
-            <a:endParaRPr lang="en-US" i="1" dirty="0"/>
-          </a:p>
-          <a:p>
-            <a:endParaRPr lang="en-US" i="1" dirty="0"/>
-          </a:p>
-          <a:p>
-            <a:endParaRPr lang="en-US" dirty="0"/>
-          </a:p>
-        </p:txBody>
-      </p:sp>
-    </p:spTree>
-    <p:extLst>
-      <p:ext uri="{BB962C8B-B14F-4D97-AF65-F5344CB8AC3E}">
-        <p14:creationId xmlns:p14="http://schemas.microsoft.com/office/powerpoint/2010/main" val="4108084837"/>
-      </p:ext>
-    </p:extLst>
-  </p:cSld>
-  <p:clrMapOvr>
-    <a:masterClrMapping/>
-  </p:clrMapOvr>
-</p:sld>
-</file>
-
-<file path=ppt/slides/slide31.xml><?xml version="1.0" encoding="utf-8"?>
-<p:sld xmlns:a="http://schemas.openxmlformats.org/drawingml/2006/main" xmlns:r="http://schemas.openxmlformats.org/officeDocument/2006/relationships" xmlns:p="http://schemas.openxmlformats.org/presentationml/2006/main">
-  <p:cSld>
-    <p:spTree>
-      <p:nvGrpSpPr>
-        <p:cNvPr id="1" name=""/>
-        <p:cNvGrpSpPr/>
-        <p:nvPr/>
-      </p:nvGrpSpPr>
-      <p:grpSpPr>
-        <a:xfrm>
-          <a:off x="0" y="0"/>
-          <a:ext cx="0" cy="0"/>
-          <a:chOff x="0" y="0"/>
-          <a:chExt cx="0" cy="0"/>
-        </a:xfrm>
-      </p:grpSpPr>
-      <p:sp>
-        <p:nvSpPr>
-          <p:cNvPr id="2" name="Title 1">
-            <a:extLst>
-              <a:ext uri="{FF2B5EF4-FFF2-40B4-BE49-F238E27FC236}">
-                <a16:creationId xmlns:a16="http://schemas.microsoft.com/office/drawing/2014/main" id="{2219958F-55A5-8230-D0F0-C1C5A2EA48F4}"/>
-              </a:ext>
-            </a:extLst>
-          </p:cNvPr>
-          <p:cNvSpPr>
-            <a:spLocks noGrp="1"/>
-          </p:cNvSpPr>
-          <p:nvPr>
-            <p:ph type="title"/>
-          </p:nvPr>
-        </p:nvSpPr>
-        <p:spPr/>
-        <p:txBody>
-          <a:bodyPr/>
-          <a:lstStyle/>
-          <a:p>
-            <a:r>
-              <a:rPr lang="en-US" dirty="0"/>
               <a:t>Future work</a:t>
             </a:r>
           </a:p>
@@ -12331,7 +12207,7 @@
 </p:sld>
 </file>
 
-<file path=ppt/slides/slide32.xml><?xml version="1.0" encoding="utf-8"?>
+<file path=ppt/slides/slide31.xml><?xml version="1.0" encoding="utf-8"?>
 <p:sld xmlns:a="http://schemas.openxmlformats.org/drawingml/2006/main" xmlns:r="http://schemas.openxmlformats.org/officeDocument/2006/relationships" xmlns:p="http://schemas.openxmlformats.org/presentationml/2006/main">
   <p:cSld>
     <p:spTree>

</xml_diff>

<commit_message>
modify PPT and add experimentation with logged cols
</commit_message>
<xml_diff>
--- a/Customer-Segmentation-Presentation.pptx
+++ b/Customer-Segmentation-Presentation.pptx
@@ -12166,6 +12166,20 @@
             <a:r>
               <a:rPr lang="en-US" sz="9400" dirty="0"/>
               <a:t>Can the store learn to do profitable business with Cluster 2-4?</a:t>
+            </a:r>
+          </a:p>
+          <a:p>
+            <a:pPr lvl="1"/>
+            <a:r>
+              <a:rPr lang="en-US" sz="9400" dirty="0"/>
+              <a:t>Get more granular data</a:t>
+            </a:r>
+          </a:p>
+          <a:p>
+            <a:pPr lvl="1"/>
+            <a:r>
+              <a:rPr lang="en-US" sz="9400" dirty="0"/>
+              <a:t>Get more data on profitability rather than just revenue</a:t>
             </a:r>
           </a:p>
           <a:p>

</xml_diff>

<commit_message>
add analysis based on proportion of daily income spent
</commit_message>
<xml_diff>
--- a/Customer-Segmentation-Presentation.pptx
+++ b/Customer-Segmentation-Presentation.pptx
@@ -5,7 +5,7 @@
     <p:sldMasterId id="2147483648" r:id="rId1"/>
   </p:sldMasterIdLst>
   <p:notesMasterIdLst>
-    <p:notesMasterId r:id="rId33"/>
+    <p:notesMasterId r:id="rId34"/>
   </p:notesMasterIdLst>
   <p:sldIdLst>
     <p:sldId id="258" r:id="rId2"/>
@@ -36,9 +36,10 @@
     <p:sldId id="313" r:id="rId27"/>
     <p:sldId id="314" r:id="rId28"/>
     <p:sldId id="317" r:id="rId29"/>
-    <p:sldId id="294" r:id="rId30"/>
-    <p:sldId id="321" r:id="rId31"/>
-    <p:sldId id="297" r:id="rId32"/>
+    <p:sldId id="322" r:id="rId30"/>
+    <p:sldId id="294" r:id="rId31"/>
+    <p:sldId id="321" r:id="rId32"/>
+    <p:sldId id="297" r:id="rId33"/>
   </p:sldIdLst>
   <p:sldSz cx="12192000" cy="6858000"/>
   <p:notesSz cx="6858000" cy="9144000"/>
@@ -227,7 +228,7 @@
           <a:p>
             <a:fld id="{A5C20BB3-3CCB-4FE5-991B-82F6BCB48AF3}" type="datetimeFigureOut">
               <a:rPr lang="en-US" smtClean="0"/>
-              <a:t>7/26/22</a:t>
+              <a:t>7/27/22</a:t>
             </a:fld>
             <a:endParaRPr lang="en-US"/>
           </a:p>
@@ -1160,7 +1161,7 @@
             <a:fld id="{B61BEF0D-F0BB-DE4B-95CE-6DB70DBA9567}" type="datetimeFigureOut">
               <a:rPr lang="en-US" dirty="0"/>
               <a:pPr/>
-              <a:t>7/26/22</a:t>
+              <a:t>7/27/22</a:t>
             </a:fld>
             <a:endParaRPr lang="en-US" dirty="0"/>
           </a:p>
@@ -1424,7 +1425,7 @@
             <a:fld id="{B61BEF0D-F0BB-DE4B-95CE-6DB70DBA9567}" type="datetimeFigureOut">
               <a:rPr lang="en-US" dirty="0"/>
               <a:pPr/>
-              <a:t>7/26/22</a:t>
+              <a:t>7/27/22</a:t>
             </a:fld>
             <a:endParaRPr lang="en-US" dirty="0"/>
           </a:p>
@@ -1661,7 +1662,7 @@
             <a:fld id="{B61BEF0D-F0BB-DE4B-95CE-6DB70DBA9567}" type="datetimeFigureOut">
               <a:rPr lang="en-US" dirty="0"/>
               <a:pPr/>
-              <a:t>7/26/22</a:t>
+              <a:t>7/27/22</a:t>
             </a:fld>
             <a:endParaRPr lang="en-US" dirty="0"/>
           </a:p>
@@ -1903,7 +1904,7 @@
             <a:fld id="{B61BEF0D-F0BB-DE4B-95CE-6DB70DBA9567}" type="datetimeFigureOut">
               <a:rPr lang="en-US" dirty="0"/>
               <a:pPr/>
-              <a:t>7/26/22</a:t>
+              <a:t>7/27/22</a:t>
             </a:fld>
             <a:endParaRPr lang="en-US" dirty="0"/>
           </a:p>
@@ -2212,7 +2213,7 @@
             <a:fld id="{B61BEF0D-F0BB-DE4B-95CE-6DB70DBA9567}" type="datetimeFigureOut">
               <a:rPr lang="en-US" dirty="0"/>
               <a:pPr/>
-              <a:t>7/26/22</a:t>
+              <a:t>7/27/22</a:t>
             </a:fld>
             <a:endParaRPr lang="en-US" dirty="0"/>
           </a:p>
@@ -2516,7 +2517,7 @@
             <a:fld id="{B61BEF0D-F0BB-DE4B-95CE-6DB70DBA9567}" type="datetimeFigureOut">
               <a:rPr lang="en-US" dirty="0"/>
               <a:pPr/>
-              <a:t>7/26/22</a:t>
+              <a:t>7/27/22</a:t>
             </a:fld>
             <a:endParaRPr lang="en-US" dirty="0"/>
           </a:p>
@@ -2940,7 +2941,7 @@
             <a:fld id="{B61BEF0D-F0BB-DE4B-95CE-6DB70DBA9567}" type="datetimeFigureOut">
               <a:rPr lang="en-US" dirty="0"/>
               <a:pPr/>
-              <a:t>7/26/22</a:t>
+              <a:t>7/27/22</a:t>
             </a:fld>
             <a:endParaRPr lang="en-US" dirty="0"/>
           </a:p>
@@ -3104,7 +3105,7 @@
             <a:fld id="{B61BEF0D-F0BB-DE4B-95CE-6DB70DBA9567}" type="datetimeFigureOut">
               <a:rPr lang="en-US" dirty="0"/>
               <a:pPr/>
-              <a:t>7/26/22</a:t>
+              <a:t>7/27/22</a:t>
             </a:fld>
             <a:endParaRPr lang="en-US" dirty="0"/>
           </a:p>
@@ -3201,7 +3202,7 @@
             <a:fld id="{B61BEF0D-F0BB-DE4B-95CE-6DB70DBA9567}" type="datetimeFigureOut">
               <a:rPr lang="en-US" dirty="0"/>
               <a:pPr/>
-              <a:t>7/26/22</a:t>
+              <a:t>7/27/22</a:t>
             </a:fld>
             <a:endParaRPr lang="en-US" dirty="0"/>
           </a:p>
@@ -3581,7 +3582,7 @@
             <a:fld id="{B61BEF0D-F0BB-DE4B-95CE-6DB70DBA9567}" type="datetimeFigureOut">
               <a:rPr lang="en-US" dirty="0"/>
               <a:pPr/>
-              <a:t>7/26/22</a:t>
+              <a:t>7/27/22</a:t>
             </a:fld>
             <a:endParaRPr lang="en-US" dirty="0"/>
           </a:p>
@@ -3872,7 +3873,7 @@
             <a:fld id="{B61BEF0D-F0BB-DE4B-95CE-6DB70DBA9567}" type="datetimeFigureOut">
               <a:rPr lang="en-US" dirty="0"/>
               <a:pPr/>
-              <a:t>7/26/22</a:t>
+              <a:t>7/27/22</a:t>
             </a:fld>
             <a:endParaRPr lang="en-US" dirty="0"/>
           </a:p>
@@ -4085,7 +4086,7 @@
             <a:fld id="{B61BEF0D-F0BB-DE4B-95CE-6DB70DBA9567}" type="datetimeFigureOut">
               <a:rPr lang="en-US" dirty="0"/>
               <a:pPr/>
-              <a:t>7/26/22</a:t>
+              <a:t>7/27/22</a:t>
             </a:fld>
             <a:endParaRPr lang="en-US" dirty="0"/>
           </a:p>
@@ -11779,6 +11780,14 @@
 <file path=ppt/slides/slide29.xml><?xml version="1.0" encoding="utf-8"?>
 <p:sld xmlns:a="http://schemas.openxmlformats.org/drawingml/2006/main" xmlns:r="http://schemas.openxmlformats.org/officeDocument/2006/relationships" xmlns:p="http://schemas.openxmlformats.org/presentationml/2006/main">
   <p:cSld>
+    <p:bg>
+      <p:bgPr>
+        <a:solidFill>
+          <a:schemeClr val="bg1"/>
+        </a:solidFill>
+        <a:effectLst/>
+      </p:bgPr>
+    </p:bg>
     <p:spTree>
       <p:nvGrpSpPr>
         <p:cNvPr id="1" name=""/>
@@ -11793,12 +11802,126 @@
           <a:chExt cx="0" cy="0"/>
         </a:xfrm>
       </p:grpSpPr>
+      <p:sp useBgFill="1">
+        <p:nvSpPr>
+          <p:cNvPr id="70" name="Rectangle 69">
+            <a:extLst>
+              <a:ext uri="{FF2B5EF4-FFF2-40B4-BE49-F238E27FC236}">
+                <a16:creationId xmlns:a16="http://schemas.microsoft.com/office/drawing/2014/main" id="{2A28AC4B-805D-4091-A648-61572081C7FB}"/>
+              </a:ext>
+              <a:ext uri="{C183D7F6-B498-43B3-948B-1728B52AA6E4}">
+                <adec:decorative xmlns:adec="http://schemas.microsoft.com/office/drawing/2017/decorative" val="1"/>
+              </a:ext>
+            </a:extLst>
+          </p:cNvPr>
+          <p:cNvSpPr>
+            <a:spLocks noGrp="1" noRot="1" noChangeAspect="1" noMove="1" noResize="1" noEditPoints="1" noAdjustHandles="1" noChangeArrowheads="1" noChangeShapeType="1" noTextEdit="1"/>
+          </p:cNvSpPr>
+          <p:nvPr>
+            <p:extLst>
+              <p:ext uri="{386F3935-93C4-4BCD-93E2-E3B085C9AB24}">
+                <p16:designElem xmlns:p16="http://schemas.microsoft.com/office/powerpoint/2015/main" val="1"/>
+              </p:ext>
+            </p:extLst>
+          </p:nvPr>
+        </p:nvSpPr>
+        <p:spPr>
+          <a:xfrm>
+            <a:off x="0" y="614406"/>
+            <a:ext cx="12192000" cy="6243593"/>
+          </a:xfrm>
+          <a:prstGeom prst="rect">
+            <a:avLst/>
+          </a:prstGeom>
+          <a:ln>
+            <a:noFill/>
+          </a:ln>
+        </p:spPr>
+        <p:style>
+          <a:lnRef idx="2">
+            <a:schemeClr val="accent1">
+              <a:shade val="50000"/>
+            </a:schemeClr>
+          </a:lnRef>
+          <a:fillRef idx="1">
+            <a:schemeClr val="accent1"/>
+          </a:fillRef>
+          <a:effectRef idx="0">
+            <a:schemeClr val="accent1"/>
+          </a:effectRef>
+          <a:fontRef idx="minor">
+            <a:schemeClr val="lt1"/>
+          </a:fontRef>
+        </p:style>
+        <p:txBody>
+          <a:bodyPr rtlCol="0" anchor="ctr"/>
+          <a:lstStyle/>
+          <a:p>
+            <a:pPr algn="ctr"/>
+            <a:endParaRPr lang="en-US"/>
+          </a:p>
+        </p:txBody>
+      </p:sp>
+      <p:sp>
+        <p:nvSpPr>
+          <p:cNvPr id="72" name="Rectangle 71">
+            <a:extLst>
+              <a:ext uri="{FF2B5EF4-FFF2-40B4-BE49-F238E27FC236}">
+                <a16:creationId xmlns:a16="http://schemas.microsoft.com/office/drawing/2014/main" id="{39373A6F-2E1F-4613-8E1D-D68057D29F31}"/>
+              </a:ext>
+              <a:ext uri="{C183D7F6-B498-43B3-948B-1728B52AA6E4}">
+                <adec:decorative xmlns:adec="http://schemas.microsoft.com/office/drawing/2017/decorative" val="1"/>
+              </a:ext>
+            </a:extLst>
+          </p:cNvPr>
+          <p:cNvSpPr>
+            <a:spLocks noGrp="1" noRot="1" noChangeAspect="1" noMove="1" noResize="1" noEditPoints="1" noAdjustHandles="1" noChangeArrowheads="1" noChangeShapeType="1" noTextEdit="1"/>
+          </p:cNvSpPr>
+          <p:nvPr>
+            <p:extLst>
+              <p:ext uri="{386F3935-93C4-4BCD-93E2-E3B085C9AB24}">
+                <p16:designElem xmlns:p16="http://schemas.microsoft.com/office/powerpoint/2015/main" val="1"/>
+              </p:ext>
+            </p:extLst>
+          </p:nvPr>
+        </p:nvSpPr>
+        <p:spPr>
+          <a:xfrm>
+            <a:off x="442377" y="614407"/>
+            <a:ext cx="3707477" cy="5611772"/>
+          </a:xfrm>
+          <a:prstGeom prst="rect">
+            <a:avLst/>
+          </a:prstGeom>
+          <a:solidFill>
+            <a:schemeClr val="accent1"/>
+          </a:solidFill>
+          <a:ln>
+            <a:noFill/>
+          </a:ln>
+          <a:effectLst/>
+        </p:spPr>
+        <p:style>
+          <a:lnRef idx="1">
+            <a:schemeClr val="accent1"/>
+          </a:lnRef>
+          <a:fillRef idx="3">
+            <a:schemeClr val="accent1"/>
+          </a:fillRef>
+          <a:effectRef idx="2">
+            <a:schemeClr val="accent1"/>
+          </a:effectRef>
+          <a:fontRef idx="minor">
+            <a:schemeClr val="lt1"/>
+          </a:fontRef>
+        </p:style>
+      </p:sp>
       <p:sp>
         <p:nvSpPr>
           <p:cNvPr id="2" name="Title 1">
             <a:extLst>
               <a:ext uri="{FF2B5EF4-FFF2-40B4-BE49-F238E27FC236}">
-                <a16:creationId xmlns:a16="http://schemas.microsoft.com/office/drawing/2014/main" id="{2219958F-55A5-8230-D0F0-C1C5A2EA48F4}"/>
+                <a16:creationId xmlns:a16="http://schemas.microsoft.com/office/drawing/2014/main" id="{16E3090D-4022-E03A-003E-E3E0632AB5FF}"/>
               </a:ext>
             </a:extLst>
           </p:cNvPr>
@@ -11809,120 +11932,167 @@
             <p:ph type="title"/>
           </p:nvPr>
         </p:nvSpPr>
-        <p:spPr/>
-        <p:txBody>
-          <a:bodyPr/>
-          <a:lstStyle/>
-          <a:p>
-            <a:r>
-              <a:rPr lang="en-US" dirty="0"/>
-              <a:t>Summary of findings</a:t>
-            </a:r>
-          </a:p>
-        </p:txBody>
-      </p:sp>
-      <p:sp>
-        <p:nvSpPr>
-          <p:cNvPr id="3" name="Content Placeholder 2">
-            <a:extLst>
-              <a:ext uri="{FF2B5EF4-FFF2-40B4-BE49-F238E27FC236}">
-                <a16:creationId xmlns:a16="http://schemas.microsoft.com/office/drawing/2014/main" id="{0CF5FD2C-87D9-9295-2774-E99BFB637AED}"/>
-              </a:ext>
-            </a:extLst>
-          </p:cNvPr>
-          <p:cNvSpPr>
-            <a:spLocks noGrp="1"/>
-          </p:cNvSpPr>
-          <p:nvPr>
-            <p:ph idx="1"/>
-          </p:nvPr>
-        </p:nvSpPr>
-        <p:spPr>
-          <a:xfrm>
-            <a:off x="581193" y="2477541"/>
-            <a:ext cx="11029615" cy="3678303"/>
+        <p:spPr>
+          <a:xfrm>
+            <a:off x="601255" y="702156"/>
+            <a:ext cx="3409783" cy="1013800"/>
           </a:xfrm>
         </p:spPr>
         <p:txBody>
           <a:bodyPr>
-            <a:normAutofit fontScale="25000" lnSpcReduction="20000"/>
+            <a:normAutofit/>
           </a:bodyPr>
           <a:lstStyle/>
           <a:p>
-            <a:endParaRPr lang="en-US" i="1" dirty="0"/>
-          </a:p>
-          <a:p>
-            <a:endParaRPr lang="en-US" i="1" dirty="0"/>
-          </a:p>
-          <a:p>
-            <a:endParaRPr lang="en-US" sz="9600" i="1" dirty="0"/>
-          </a:p>
-          <a:p>
-            <a:r>
-              <a:rPr lang="en-US" sz="9600" dirty="0"/>
-              <a:t>If run deals, target these at Clusters 2-4 </a:t>
-            </a:r>
-          </a:p>
-          <a:p>
-            <a:r>
-              <a:rPr lang="en-US" sz="9600" dirty="0"/>
-              <a:t>Concentrate on making/keeping the web page appealing for Clusters 0, 1, and 5</a:t>
-            </a:r>
-          </a:p>
-          <a:p>
-            <a:r>
-              <a:rPr lang="en-US" sz="9600" dirty="0"/>
-              <a:t>Make sure to have a polished catalog, especially for Cluster 5 customers, who could bring in the most revenue in the future</a:t>
-            </a:r>
-          </a:p>
-          <a:p>
-            <a:r>
-              <a:rPr lang="en-US" sz="9600" dirty="0"/>
-              <a:t>Make customers’ in-store experience customers pleasant as high-spending clusters seem to value it</a:t>
-            </a:r>
-          </a:p>
-          <a:p>
-            <a:r>
-              <a:rPr lang="en-US" sz="9600" dirty="0"/>
-              <a:t>Learn from Campaign 2 in order to not repeat it</a:t>
-            </a:r>
-          </a:p>
-          <a:p>
-            <a:r>
-              <a:rPr lang="en-US" sz="9600" dirty="0"/>
-              <a:t>Concentrate on running and improving campaigns like Campaign1 and 5, as these attract the high-spending customers</a:t>
-            </a:r>
-          </a:p>
-          <a:p>
-            <a:r>
-              <a:rPr lang="en-US" sz="9600" dirty="0"/>
-              <a:t>Concentrate on identifying and attracting customers like Cluster 5 for highest future expected revenue</a:t>
-            </a:r>
-          </a:p>
-          <a:p>
-            <a:pPr marL="0" indent="0">
-              <a:buNone/>
+            <a:pPr>
+              <a:lnSpc>
+                <a:spcPct val="90000"/>
+              </a:lnSpc>
             </a:pPr>
-            <a:endParaRPr lang="en-US" sz="9600" i="1" dirty="0"/>
-          </a:p>
-          <a:p>
-            <a:endParaRPr lang="en-US" i="1" dirty="0"/>
-          </a:p>
-          <a:p>
-            <a:endParaRPr lang="en-US" i="1" dirty="0"/>
-          </a:p>
-          <a:p>
-            <a:endParaRPr lang="en-US" i="1" dirty="0"/>
-          </a:p>
-          <a:p>
-            <a:endParaRPr lang="en-US" dirty="0"/>
-          </a:p>
-        </p:txBody>
-      </p:sp>
+            <a:r>
+              <a:rPr lang="en-US" sz="2200"/>
+              <a:t>Spending as proportion of daily income</a:t>
+            </a:r>
+          </a:p>
+        </p:txBody>
+      </p:sp>
+      <p:sp>
+        <p:nvSpPr>
+          <p:cNvPr id="74" name="Rectangle 73">
+            <a:extLst>
+              <a:ext uri="{FF2B5EF4-FFF2-40B4-BE49-F238E27FC236}">
+                <a16:creationId xmlns:a16="http://schemas.microsoft.com/office/drawing/2014/main" id="{A6D733BE-061E-4600-B6A3-62A68EF2C687}"/>
+              </a:ext>
+              <a:ext uri="{C183D7F6-B498-43B3-948B-1728B52AA6E4}">
+                <adec:decorative xmlns:adec="http://schemas.microsoft.com/office/drawing/2017/decorative" val="1"/>
+              </a:ext>
+            </a:extLst>
+          </p:cNvPr>
+          <p:cNvSpPr>
+            <a:spLocks noGrp="1" noRot="1" noChangeAspect="1" noMove="1" noResize="1" noEditPoints="1" noAdjustHandles="1" noChangeArrowheads="1" noChangeShapeType="1" noTextEdit="1"/>
+          </p:cNvSpPr>
+          <p:nvPr>
+            <p:extLst>
+              <p:ext uri="{386F3935-93C4-4BCD-93E2-E3B085C9AB24}">
+                <p16:designElem xmlns:p16="http://schemas.microsoft.com/office/powerpoint/2015/main" val="1"/>
+              </p:ext>
+            </p:extLst>
+          </p:nvPr>
+        </p:nvSpPr>
+        <p:spPr>
+          <a:xfrm>
+            <a:off x="4241830" y="457200"/>
+            <a:ext cx="3703320" cy="91440"/>
+          </a:xfrm>
+          <a:prstGeom prst="rect">
+            <a:avLst/>
+          </a:prstGeom>
+          <a:solidFill>
+            <a:srgbClr val="C68460"/>
+          </a:solidFill>
+          <a:ln>
+            <a:noFill/>
+          </a:ln>
+          <a:effectLst/>
+        </p:spPr>
+        <p:style>
+          <a:lnRef idx="1">
+            <a:schemeClr val="accent1"/>
+          </a:lnRef>
+          <a:fillRef idx="3">
+            <a:schemeClr val="accent1"/>
+          </a:fillRef>
+          <a:effectRef idx="2">
+            <a:schemeClr val="accent1"/>
+          </a:effectRef>
+          <a:fontRef idx="minor">
+            <a:schemeClr val="lt1"/>
+          </a:fontRef>
+        </p:style>
+      </p:sp>
+      <p:sp>
+        <p:nvSpPr>
+          <p:cNvPr id="13" name="Content Placeholder 12">
+            <a:extLst>
+              <a:ext uri="{FF2B5EF4-FFF2-40B4-BE49-F238E27FC236}">
+                <a16:creationId xmlns:a16="http://schemas.microsoft.com/office/drawing/2014/main" id="{BF8BDCC7-A0C9-D029-9AC7-BDC980490740}"/>
+              </a:ext>
+            </a:extLst>
+          </p:cNvPr>
+          <p:cNvSpPr>
+            <a:spLocks noGrp="1"/>
+          </p:cNvSpPr>
+          <p:nvPr>
+            <p:ph idx="1"/>
+          </p:nvPr>
+        </p:nvSpPr>
+        <p:spPr>
+          <a:xfrm>
+            <a:off x="601255" y="1964168"/>
+            <a:ext cx="3409782" cy="4036582"/>
+          </a:xfrm>
+        </p:spPr>
+        <p:txBody>
+          <a:bodyPr>
+            <a:normAutofit/>
+          </a:bodyPr>
+          <a:lstStyle/>
+          <a:p>
+            <a:r>
+              <a:rPr lang="en-US" dirty="0">
+                <a:solidFill>
+                  <a:schemeClr val="bg1"/>
+                </a:solidFill>
+              </a:rPr>
+              <a:t> Cluster 5 is still in the lead followed by Clusters 1 and 0. Cluster 5 spends over 4% of their income at the store while Clusters 0 and 1 spend just over 2%. </a:t>
+            </a:r>
+          </a:p>
+          <a:p>
+            <a:r>
+              <a:rPr lang="en-US" i="1" dirty="0">
+                <a:solidFill>
+                  <a:schemeClr val="bg1"/>
+                </a:solidFill>
+              </a:rPr>
+              <a:t>Look for ways to attract customers away from the alternatives</a:t>
+            </a:r>
+          </a:p>
+        </p:txBody>
+      </p:sp>
+      <p:pic>
+        <p:nvPicPr>
+          <p:cNvPr id="5" name="Picture 4" descr="Chart, box and whisker chart&#10;&#10;Description automatically generated">
+            <a:extLst>
+              <a:ext uri="{FF2B5EF4-FFF2-40B4-BE49-F238E27FC236}">
+                <a16:creationId xmlns:a16="http://schemas.microsoft.com/office/drawing/2014/main" id="{8D01052A-0D10-DAB6-4806-641B77C75461}"/>
+              </a:ext>
+            </a:extLst>
+          </p:cNvPr>
+          <p:cNvPicPr>
+            <a:picLocks noChangeAspect="1"/>
+          </p:cNvPicPr>
+          <p:nvPr/>
+        </p:nvPicPr>
+        <p:blipFill>
+          <a:blip r:embed="rId2"/>
+          <a:stretch>
+            <a:fillRect/>
+          </a:stretch>
+        </p:blipFill>
+        <p:spPr>
+          <a:xfrm>
+            <a:off x="4401141" y="575189"/>
+            <a:ext cx="7282013" cy="5825611"/>
+          </a:xfrm>
+          <a:prstGeom prst="rect">
+            <a:avLst/>
+          </a:prstGeom>
+        </p:spPr>
+      </p:pic>
     </p:spTree>
     <p:extLst>
       <p:ext uri="{BB962C8B-B14F-4D97-AF65-F5344CB8AC3E}">
-        <p14:creationId xmlns:p14="http://schemas.microsoft.com/office/powerpoint/2010/main" val="4108084837"/>
+        <p14:creationId xmlns:p14="http://schemas.microsoft.com/office/powerpoint/2010/main" val="1642588206"/>
       </p:ext>
     </p:extLst>
   </p:cSld>
@@ -12093,7 +12263,7 @@
           <a:p>
             <a:r>
               <a:rPr lang="en-US" dirty="0"/>
-              <a:t>Future work</a:t>
+              <a:t>Summary of findings</a:t>
             </a:r>
           </a:p>
         </p:txBody>
@@ -12135,56 +12305,256 @@
             <a:endParaRPr lang="en-US" sz="9600" i="1" dirty="0"/>
           </a:p>
           <a:p>
-            <a:r>
-              <a:rPr lang="en-US" sz="9600" dirty="0"/>
+            <a:endParaRPr lang="en-US" sz="8000" dirty="0"/>
+          </a:p>
+          <a:p>
+            <a:endParaRPr lang="en-US" sz="8000" dirty="0"/>
+          </a:p>
+          <a:p>
+            <a:endParaRPr lang="en-US" sz="8000" dirty="0"/>
+          </a:p>
+          <a:p>
+            <a:r>
+              <a:rPr lang="en-US" sz="8000" dirty="0"/>
+              <a:t>If run deals, target these at Clusters 2-4 </a:t>
+            </a:r>
+          </a:p>
+          <a:p>
+            <a:r>
+              <a:rPr lang="en-US" sz="8000" dirty="0"/>
+              <a:t>Concentrate on making/keeping the web page appealing for Clusters 0, 1, and 5</a:t>
+            </a:r>
+          </a:p>
+          <a:p>
+            <a:r>
+              <a:rPr lang="en-US" sz="8000" dirty="0"/>
+              <a:t>Make sure to have a polished catalog, especially for Cluster 5 customers, who could bring in the most revenue in the future</a:t>
+            </a:r>
+          </a:p>
+          <a:p>
+            <a:r>
+              <a:rPr lang="en-US" sz="8000" dirty="0"/>
+              <a:t>Make customers’ in-store experience customers pleasant as high-spending clusters seem to value it</a:t>
+            </a:r>
+          </a:p>
+          <a:p>
+            <a:r>
+              <a:rPr lang="en-US" sz="8000" dirty="0"/>
+              <a:t>Learn from Campaign 2 in order to not repeat it</a:t>
+            </a:r>
+          </a:p>
+          <a:p>
+            <a:r>
+              <a:rPr lang="en-US" sz="8000" dirty="0"/>
+              <a:t>Concentrate on running and improving campaigns like Campaign1 and 5, as these attract the high-spending customers</a:t>
+            </a:r>
+          </a:p>
+          <a:p>
+            <a:r>
+              <a:rPr lang="en-US" sz="8000" dirty="0"/>
+              <a:t>Concentrate on identifying and attracting customers like Cluster 5 for highest future expected revenue </a:t>
+            </a:r>
+          </a:p>
+          <a:p>
+            <a:r>
+              <a:rPr lang="en-US" sz="8000" dirty="0"/>
+              <a:t>Look for ways to attract customers away from the alternatives as customers spend a moderate proportion of their daily income at the store</a:t>
+            </a:r>
+            <a:r>
+              <a:rPr lang="en-US" sz="8000" i="1" dirty="0">
+                <a:solidFill>
+                  <a:schemeClr val="bg1"/>
+                </a:solidFill>
+              </a:rPr>
+              <a:t> ways </a:t>
+            </a:r>
+            <a:r>
+              <a:rPr lang="en-US" sz="9600" i="1" dirty="0">
+                <a:solidFill>
+                  <a:schemeClr val="bg1"/>
+                </a:solidFill>
+              </a:rPr>
+              <a:t>to attract customers away from the alternatives</a:t>
+            </a:r>
+          </a:p>
+          <a:p>
+            <a:endParaRPr lang="en-US" sz="9600" dirty="0"/>
+          </a:p>
+          <a:p>
+            <a:pPr marL="0" indent="0">
+              <a:buNone/>
+            </a:pPr>
+            <a:endParaRPr lang="en-US" sz="9600" i="1" dirty="0"/>
+          </a:p>
+          <a:p>
+            <a:endParaRPr lang="en-US" i="1" dirty="0"/>
+          </a:p>
+          <a:p>
+            <a:endParaRPr lang="en-US" i="1" dirty="0"/>
+          </a:p>
+          <a:p>
+            <a:endParaRPr lang="en-US" i="1" dirty="0"/>
+          </a:p>
+          <a:p>
+            <a:endParaRPr lang="en-US" dirty="0"/>
+          </a:p>
+        </p:txBody>
+      </p:sp>
+    </p:spTree>
+    <p:extLst>
+      <p:ext uri="{BB962C8B-B14F-4D97-AF65-F5344CB8AC3E}">
+        <p14:creationId xmlns:p14="http://schemas.microsoft.com/office/powerpoint/2010/main" val="4108084837"/>
+      </p:ext>
+    </p:extLst>
+  </p:cSld>
+  <p:clrMapOvr>
+    <a:masterClrMapping/>
+  </p:clrMapOvr>
+</p:sld>
+</file>
+
+<file path=ppt/slides/slide31.xml><?xml version="1.0" encoding="utf-8"?>
+<p:sld xmlns:a="http://schemas.openxmlformats.org/drawingml/2006/main" xmlns:r="http://schemas.openxmlformats.org/officeDocument/2006/relationships" xmlns:p="http://schemas.openxmlformats.org/presentationml/2006/main">
+  <p:cSld>
+    <p:spTree>
+      <p:nvGrpSpPr>
+        <p:cNvPr id="1" name=""/>
+        <p:cNvGrpSpPr/>
+        <p:nvPr/>
+      </p:nvGrpSpPr>
+      <p:grpSpPr>
+        <a:xfrm>
+          <a:off x="0" y="0"/>
+          <a:ext cx="0" cy="0"/>
+          <a:chOff x="0" y="0"/>
+          <a:chExt cx="0" cy="0"/>
+        </a:xfrm>
+      </p:grpSpPr>
+      <p:sp>
+        <p:nvSpPr>
+          <p:cNvPr id="2" name="Title 1">
+            <a:extLst>
+              <a:ext uri="{FF2B5EF4-FFF2-40B4-BE49-F238E27FC236}">
+                <a16:creationId xmlns:a16="http://schemas.microsoft.com/office/drawing/2014/main" id="{2219958F-55A5-8230-D0F0-C1C5A2EA48F4}"/>
+              </a:ext>
+            </a:extLst>
+          </p:cNvPr>
+          <p:cNvSpPr>
+            <a:spLocks noGrp="1"/>
+          </p:cNvSpPr>
+          <p:nvPr>
+            <p:ph type="title"/>
+          </p:nvPr>
+        </p:nvSpPr>
+        <p:spPr/>
+        <p:txBody>
+          <a:bodyPr/>
+          <a:lstStyle/>
+          <a:p>
+            <a:r>
+              <a:rPr lang="en-US" dirty="0"/>
+              <a:t>Future work</a:t>
+            </a:r>
+          </a:p>
+        </p:txBody>
+      </p:sp>
+      <p:sp>
+        <p:nvSpPr>
+          <p:cNvPr id="3" name="Content Placeholder 2">
+            <a:extLst>
+              <a:ext uri="{FF2B5EF4-FFF2-40B4-BE49-F238E27FC236}">
+                <a16:creationId xmlns:a16="http://schemas.microsoft.com/office/drawing/2014/main" id="{0CF5FD2C-87D9-9295-2774-E99BFB637AED}"/>
+              </a:ext>
+            </a:extLst>
+          </p:cNvPr>
+          <p:cNvSpPr>
+            <a:spLocks noGrp="1"/>
+          </p:cNvSpPr>
+          <p:nvPr>
+            <p:ph idx="1"/>
+          </p:nvPr>
+        </p:nvSpPr>
+        <p:spPr>
+          <a:xfrm>
+            <a:off x="581193" y="2477541"/>
+            <a:ext cx="11029615" cy="3678303"/>
+          </a:xfrm>
+        </p:spPr>
+        <p:txBody>
+          <a:bodyPr>
+            <a:normAutofit fontScale="25000" lnSpcReduction="20000"/>
+          </a:bodyPr>
+          <a:lstStyle/>
+          <a:p>
+            <a:endParaRPr lang="en-US" i="1" dirty="0"/>
+          </a:p>
+          <a:p>
+            <a:endParaRPr lang="en-US" i="1" dirty="0"/>
+          </a:p>
+          <a:p>
+            <a:endParaRPr lang="en-US" sz="9600" i="1" dirty="0"/>
+          </a:p>
+          <a:p>
+            <a:endParaRPr lang="en-US" sz="9600" dirty="0"/>
+          </a:p>
+          <a:p>
+            <a:r>
+              <a:rPr lang="en-US" sz="8000" dirty="0"/>
               <a:t>It would be helpful to have more information about the data set and the store in order to answer the following questions:</a:t>
             </a:r>
           </a:p>
           <a:p>
             <a:pPr lvl="1"/>
             <a:r>
-              <a:rPr lang="en-US" sz="9400" dirty="0"/>
+              <a:rPr lang="en-US" sz="8000" dirty="0"/>
               <a:t>What do we know about the rationale behind each campaign? What distinguishes the campaigns?</a:t>
             </a:r>
           </a:p>
           <a:p>
             <a:pPr lvl="1"/>
             <a:r>
-              <a:rPr lang="en-US" sz="9400" dirty="0"/>
+              <a:rPr lang="en-US" sz="8000" dirty="0"/>
               <a:t>What more can we learn about our customers? Specifically, are there factors that differentiate Cluster 5 that are not in the data?</a:t>
             </a:r>
           </a:p>
           <a:p>
             <a:pPr lvl="1"/>
             <a:r>
-              <a:rPr lang="en-US" sz="9400" dirty="0"/>
+              <a:rPr lang="en-US" sz="8000" dirty="0"/>
               <a:t>What else can be learned about the way the store is making customers in-store and online shopping experience pleasant? Are there way to improve?</a:t>
             </a:r>
           </a:p>
           <a:p>
             <a:pPr lvl="1"/>
             <a:r>
-              <a:rPr lang="en-US" sz="9400" dirty="0"/>
+              <a:rPr lang="en-US" sz="8000" dirty="0"/>
               <a:t>Can the store learn to do profitable business with Cluster 2-4?</a:t>
             </a:r>
           </a:p>
           <a:p>
             <a:pPr lvl="1"/>
             <a:r>
-              <a:rPr lang="en-US" sz="9400" dirty="0"/>
-              <a:t>Get more granular data</a:t>
+              <a:rPr lang="en-US" sz="8000" dirty="0"/>
+              <a:t>Get more granular data on store purchases</a:t>
             </a:r>
           </a:p>
           <a:p>
             <a:pPr lvl="1"/>
             <a:r>
-              <a:rPr lang="en-US" sz="9400" dirty="0"/>
-              <a:t>Get more data on profitability rather than just revenue</a:t>
-            </a:r>
-          </a:p>
-          <a:p>
-            <a:r>
-              <a:rPr lang="en-US" sz="9600" dirty="0"/>
+              <a:rPr lang="en-US" sz="8000" dirty="0"/>
+              <a:t>Get data on campaign costs </a:t>
+            </a:r>
+          </a:p>
+          <a:p>
+            <a:pPr lvl="1"/>
+            <a:r>
+              <a:rPr lang="en-US" sz="8000" dirty="0"/>
+              <a:t>Get more data on profitability rather than just revenue, as profitability is the key objective</a:t>
+            </a:r>
+          </a:p>
+          <a:p>
+            <a:r>
+              <a:rPr lang="en-US" sz="8000" dirty="0"/>
               <a:t>Do A/B testing to judge the effectiveness of recommendations</a:t>
             </a:r>
           </a:p>
@@ -12221,7 +12591,7 @@
 </p:sld>
 </file>
 
-<file path=ppt/slides/slide31.xml><?xml version="1.0" encoding="utf-8"?>
+<file path=ppt/slides/slide32.xml><?xml version="1.0" encoding="utf-8"?>
 <p:sld xmlns:a="http://schemas.openxmlformats.org/drawingml/2006/main" xmlns:r="http://schemas.openxmlformats.org/officeDocument/2006/relationships" xmlns:p="http://schemas.openxmlformats.org/presentationml/2006/main">
   <p:cSld>
     <p:spTree>

</xml_diff>

<commit_message>
add avg spending analysis and explanation regarding pre-logging vars to 002
</commit_message>
<xml_diff>
--- a/Customer-Segmentation-Presentation.pptx
+++ b/Customer-Segmentation-Presentation.pptx
@@ -5,7 +5,7 @@
     <p:sldMasterId id="2147483648" r:id="rId1"/>
   </p:sldMasterIdLst>
   <p:notesMasterIdLst>
-    <p:notesMasterId r:id="rId34"/>
+    <p:notesMasterId r:id="rId35"/>
   </p:notesMasterIdLst>
   <p:sldIdLst>
     <p:sldId id="258" r:id="rId2"/>
@@ -39,7 +39,8 @@
     <p:sldId id="322" r:id="rId30"/>
     <p:sldId id="294" r:id="rId31"/>
     <p:sldId id="321" r:id="rId32"/>
-    <p:sldId id="297" r:id="rId33"/>
+    <p:sldId id="323" r:id="rId33"/>
+    <p:sldId id="297" r:id="rId34"/>
   </p:sldIdLst>
   <p:sldSz cx="12192000" cy="6858000"/>
   <p:notesSz cx="6858000" cy="9144000"/>
@@ -228,7 +229,7 @@
           <a:p>
             <a:fld id="{A5C20BB3-3CCB-4FE5-991B-82F6BCB48AF3}" type="datetimeFigureOut">
               <a:rPr lang="en-US" smtClean="0"/>
-              <a:t>7/27/22</a:t>
+              <a:t>7/28/22</a:t>
             </a:fld>
             <a:endParaRPr lang="en-US"/>
           </a:p>
@@ -1161,7 +1162,7 @@
             <a:fld id="{B61BEF0D-F0BB-DE4B-95CE-6DB70DBA9567}" type="datetimeFigureOut">
               <a:rPr lang="en-US" dirty="0"/>
               <a:pPr/>
-              <a:t>7/27/22</a:t>
+              <a:t>7/28/22</a:t>
             </a:fld>
             <a:endParaRPr lang="en-US" dirty="0"/>
           </a:p>
@@ -1425,7 +1426,7 @@
             <a:fld id="{B61BEF0D-F0BB-DE4B-95CE-6DB70DBA9567}" type="datetimeFigureOut">
               <a:rPr lang="en-US" dirty="0"/>
               <a:pPr/>
-              <a:t>7/27/22</a:t>
+              <a:t>7/28/22</a:t>
             </a:fld>
             <a:endParaRPr lang="en-US" dirty="0"/>
           </a:p>
@@ -1662,7 +1663,7 @@
             <a:fld id="{B61BEF0D-F0BB-DE4B-95CE-6DB70DBA9567}" type="datetimeFigureOut">
               <a:rPr lang="en-US" dirty="0"/>
               <a:pPr/>
-              <a:t>7/27/22</a:t>
+              <a:t>7/28/22</a:t>
             </a:fld>
             <a:endParaRPr lang="en-US" dirty="0"/>
           </a:p>
@@ -1904,7 +1905,7 @@
             <a:fld id="{B61BEF0D-F0BB-DE4B-95CE-6DB70DBA9567}" type="datetimeFigureOut">
               <a:rPr lang="en-US" dirty="0"/>
               <a:pPr/>
-              <a:t>7/27/22</a:t>
+              <a:t>7/28/22</a:t>
             </a:fld>
             <a:endParaRPr lang="en-US" dirty="0"/>
           </a:p>
@@ -2213,7 +2214,7 @@
             <a:fld id="{B61BEF0D-F0BB-DE4B-95CE-6DB70DBA9567}" type="datetimeFigureOut">
               <a:rPr lang="en-US" dirty="0"/>
               <a:pPr/>
-              <a:t>7/27/22</a:t>
+              <a:t>7/28/22</a:t>
             </a:fld>
             <a:endParaRPr lang="en-US" dirty="0"/>
           </a:p>
@@ -2517,7 +2518,7 @@
             <a:fld id="{B61BEF0D-F0BB-DE4B-95CE-6DB70DBA9567}" type="datetimeFigureOut">
               <a:rPr lang="en-US" dirty="0"/>
               <a:pPr/>
-              <a:t>7/27/22</a:t>
+              <a:t>7/28/22</a:t>
             </a:fld>
             <a:endParaRPr lang="en-US" dirty="0"/>
           </a:p>
@@ -2941,7 +2942,7 @@
             <a:fld id="{B61BEF0D-F0BB-DE4B-95CE-6DB70DBA9567}" type="datetimeFigureOut">
               <a:rPr lang="en-US" dirty="0"/>
               <a:pPr/>
-              <a:t>7/27/22</a:t>
+              <a:t>7/28/22</a:t>
             </a:fld>
             <a:endParaRPr lang="en-US" dirty="0"/>
           </a:p>
@@ -3105,7 +3106,7 @@
             <a:fld id="{B61BEF0D-F0BB-DE4B-95CE-6DB70DBA9567}" type="datetimeFigureOut">
               <a:rPr lang="en-US" dirty="0"/>
               <a:pPr/>
-              <a:t>7/27/22</a:t>
+              <a:t>7/28/22</a:t>
             </a:fld>
             <a:endParaRPr lang="en-US" dirty="0"/>
           </a:p>
@@ -3202,7 +3203,7 @@
             <a:fld id="{B61BEF0D-F0BB-DE4B-95CE-6DB70DBA9567}" type="datetimeFigureOut">
               <a:rPr lang="en-US" dirty="0"/>
               <a:pPr/>
-              <a:t>7/27/22</a:t>
+              <a:t>7/28/22</a:t>
             </a:fld>
             <a:endParaRPr lang="en-US" dirty="0"/>
           </a:p>
@@ -3582,7 +3583,7 @@
             <a:fld id="{B61BEF0D-F0BB-DE4B-95CE-6DB70DBA9567}" type="datetimeFigureOut">
               <a:rPr lang="en-US" dirty="0"/>
               <a:pPr/>
-              <a:t>7/27/22</a:t>
+              <a:t>7/28/22</a:t>
             </a:fld>
             <a:endParaRPr lang="en-US" dirty="0"/>
           </a:p>
@@ -3873,7 +3874,7 @@
             <a:fld id="{B61BEF0D-F0BB-DE4B-95CE-6DB70DBA9567}" type="datetimeFigureOut">
               <a:rPr lang="en-US" dirty="0"/>
               <a:pPr/>
-              <a:t>7/27/22</a:t>
+              <a:t>7/28/22</a:t>
             </a:fld>
             <a:endParaRPr lang="en-US" dirty="0"/>
           </a:p>
@@ -4086,7 +4087,7 @@
             <a:fld id="{B61BEF0D-F0BB-DE4B-95CE-6DB70DBA9567}" type="datetimeFigureOut">
               <a:rPr lang="en-US" dirty="0"/>
               <a:pPr/>
-              <a:t>7/27/22</a:t>
+              <a:t>7/28/22</a:t>
             </a:fld>
             <a:endParaRPr lang="en-US" dirty="0"/>
           </a:p>
@@ -12453,7 +12454,7 @@
           <a:p>
             <a:r>
               <a:rPr lang="en-US" dirty="0"/>
-              <a:t>Future work</a:t>
+              <a:t>Future work (part 1)</a:t>
             </a:r>
           </a:p>
         </p:txBody>
@@ -12476,7 +12477,7 @@
         </p:nvSpPr>
         <p:spPr>
           <a:xfrm>
-            <a:off x="581193" y="2477541"/>
+            <a:off x="581192" y="2073780"/>
             <a:ext cx="11029615" cy="3678303"/>
           </a:xfrm>
         </p:spPr>
@@ -12514,7 +12515,15 @@
             <a:pPr lvl="1"/>
             <a:r>
               <a:rPr lang="en-US" sz="8000" dirty="0"/>
-              <a:t>What more can we learn about our customers? Specifically, are there factors that differentiate Cluster 5 that are not in the data?</a:t>
+              <a:t>What more can we learn about our customers? Specifically, are there factors that differentiate Cluster 5 that are not in the data? (</a:t>
+            </a:r>
+            <a:r>
+              <a:rPr lang="en-US" sz="8000" u="sng" dirty="0"/>
+              <a:t>Surveys</a:t>
+            </a:r>
+            <a:r>
+              <a:rPr lang="en-US" sz="8000" dirty="0"/>
+              <a:t>)</a:t>
             </a:r>
           </a:p>
           <a:p>
@@ -12529,33 +12538,6 @@
             <a:r>
               <a:rPr lang="en-US" sz="8000" dirty="0"/>
               <a:t>Can the store learn to do profitable business with Cluster 2-4?</a:t>
-            </a:r>
-          </a:p>
-          <a:p>
-            <a:pPr lvl="1"/>
-            <a:r>
-              <a:rPr lang="en-US" sz="8000" dirty="0"/>
-              <a:t>Get more granular data on store purchases</a:t>
-            </a:r>
-          </a:p>
-          <a:p>
-            <a:pPr lvl="1"/>
-            <a:r>
-              <a:rPr lang="en-US" sz="8000" dirty="0"/>
-              <a:t>Get data on campaign costs </a:t>
-            </a:r>
-          </a:p>
-          <a:p>
-            <a:pPr lvl="1"/>
-            <a:r>
-              <a:rPr lang="en-US" sz="8000" dirty="0"/>
-              <a:t>Get more data on profitability rather than just revenue, as profitability is the key objective</a:t>
-            </a:r>
-          </a:p>
-          <a:p>
-            <a:r>
-              <a:rPr lang="en-US" sz="8000" dirty="0"/>
-              <a:t>Do A/B testing to judge the effectiveness of recommendations</a:t>
             </a:r>
           </a:p>
           <a:p>
@@ -12592,6 +12574,150 @@
 </file>
 
 <file path=ppt/slides/slide32.xml><?xml version="1.0" encoding="utf-8"?>
+<p:sld xmlns:a="http://schemas.openxmlformats.org/drawingml/2006/main" xmlns:r="http://schemas.openxmlformats.org/officeDocument/2006/relationships" xmlns:p="http://schemas.openxmlformats.org/presentationml/2006/main">
+  <p:cSld>
+    <p:spTree>
+      <p:nvGrpSpPr>
+        <p:cNvPr id="1" name=""/>
+        <p:cNvGrpSpPr/>
+        <p:nvPr/>
+      </p:nvGrpSpPr>
+      <p:grpSpPr>
+        <a:xfrm>
+          <a:off x="0" y="0"/>
+          <a:ext cx="0" cy="0"/>
+          <a:chOff x="0" y="0"/>
+          <a:chExt cx="0" cy="0"/>
+        </a:xfrm>
+      </p:grpSpPr>
+      <p:sp>
+        <p:nvSpPr>
+          <p:cNvPr id="2" name="Title 1">
+            <a:extLst>
+              <a:ext uri="{FF2B5EF4-FFF2-40B4-BE49-F238E27FC236}">
+                <a16:creationId xmlns:a16="http://schemas.microsoft.com/office/drawing/2014/main" id="{2219958F-55A5-8230-D0F0-C1C5A2EA48F4}"/>
+              </a:ext>
+            </a:extLst>
+          </p:cNvPr>
+          <p:cNvSpPr>
+            <a:spLocks noGrp="1"/>
+          </p:cNvSpPr>
+          <p:nvPr>
+            <p:ph type="title"/>
+          </p:nvPr>
+        </p:nvSpPr>
+        <p:spPr/>
+        <p:txBody>
+          <a:bodyPr/>
+          <a:lstStyle/>
+          <a:p>
+            <a:r>
+              <a:rPr lang="en-US" dirty="0"/>
+              <a:t>Future work (part ii)</a:t>
+            </a:r>
+          </a:p>
+        </p:txBody>
+      </p:sp>
+      <p:sp>
+        <p:nvSpPr>
+          <p:cNvPr id="3" name="Content Placeholder 2">
+            <a:extLst>
+              <a:ext uri="{FF2B5EF4-FFF2-40B4-BE49-F238E27FC236}">
+                <a16:creationId xmlns:a16="http://schemas.microsoft.com/office/drawing/2014/main" id="{0CF5FD2C-87D9-9295-2774-E99BFB637AED}"/>
+              </a:ext>
+            </a:extLst>
+          </p:cNvPr>
+          <p:cNvSpPr>
+            <a:spLocks noGrp="1"/>
+          </p:cNvSpPr>
+          <p:nvPr>
+            <p:ph idx="1"/>
+          </p:nvPr>
+        </p:nvSpPr>
+        <p:spPr>
+          <a:xfrm>
+            <a:off x="581193" y="2477541"/>
+            <a:ext cx="11029615" cy="3678303"/>
+          </a:xfrm>
+        </p:spPr>
+        <p:txBody>
+          <a:bodyPr>
+            <a:normAutofit fontScale="25000" lnSpcReduction="20000"/>
+          </a:bodyPr>
+          <a:lstStyle/>
+          <a:p>
+            <a:endParaRPr lang="en-US" i="1" dirty="0"/>
+          </a:p>
+          <a:p>
+            <a:pPr marL="0" indent="0">
+              <a:buNone/>
+            </a:pPr>
+            <a:endParaRPr lang="en-US" sz="9600" dirty="0"/>
+          </a:p>
+          <a:p>
+            <a:r>
+              <a:rPr lang="en-US" sz="8200" dirty="0"/>
+              <a:t>Get more granular data on store purchases</a:t>
+            </a:r>
+          </a:p>
+          <a:p>
+            <a:r>
+              <a:rPr lang="en-US" sz="8200" dirty="0"/>
+              <a:t>Get data on campaign costs </a:t>
+            </a:r>
+          </a:p>
+          <a:p>
+            <a:r>
+              <a:rPr lang="en-US" sz="8200" dirty="0"/>
+              <a:t>Get more data on profitability rather than just revenue, as profitability is the key objective</a:t>
+            </a:r>
+          </a:p>
+          <a:p>
+            <a:r>
+              <a:rPr lang="en-US" sz="8000" dirty="0"/>
+              <a:t>Do A/B testing to judge the effectiveness of recommendations</a:t>
+            </a:r>
+          </a:p>
+          <a:p>
+            <a:r>
+              <a:rPr lang="en-US" sz="8000" dirty="0"/>
+              <a:t>Are Cluster 5 customers just a more recent group of Cluster 1 customers?  If so, can we reengage Cluster 1 and find ways to keep Cluster 5 continually engaged?</a:t>
+            </a:r>
+          </a:p>
+          <a:p>
+            <a:pPr marL="0" indent="0">
+              <a:buNone/>
+            </a:pPr>
+            <a:endParaRPr lang="en-US" sz="9600" i="1" dirty="0"/>
+          </a:p>
+          <a:p>
+            <a:endParaRPr lang="en-US" i="1" dirty="0"/>
+          </a:p>
+          <a:p>
+            <a:endParaRPr lang="en-US" i="1" dirty="0"/>
+          </a:p>
+          <a:p>
+            <a:endParaRPr lang="en-US" i="1" dirty="0"/>
+          </a:p>
+          <a:p>
+            <a:endParaRPr lang="en-US" dirty="0"/>
+          </a:p>
+        </p:txBody>
+      </p:sp>
+    </p:spTree>
+    <p:extLst>
+      <p:ext uri="{BB962C8B-B14F-4D97-AF65-F5344CB8AC3E}">
+        <p14:creationId xmlns:p14="http://schemas.microsoft.com/office/powerpoint/2010/main" val="906861200"/>
+      </p:ext>
+    </p:extLst>
+  </p:cSld>
+  <p:clrMapOvr>
+    <a:masterClrMapping/>
+  </p:clrMapOvr>
+</p:sld>
+</file>
+
+<file path=ppt/slides/slide33.xml><?xml version="1.0" encoding="utf-8"?>
 <p:sld xmlns:a="http://schemas.openxmlformats.org/drawingml/2006/main" xmlns:r="http://schemas.openxmlformats.org/officeDocument/2006/relationships" xmlns:p="http://schemas.openxmlformats.org/presentationml/2006/main">
   <p:cSld>
     <p:spTree>
@@ -13695,7 +13821,7 @@
                   <a:schemeClr val="bg1"/>
                 </a:solidFill>
               </a:rPr>
-              <a:t>Select k as the number of groups to cluster for</a:t>
+              <a:t>Select k as the number of groups to cluster for.</a:t>
             </a:r>
           </a:p>
           <a:p>
@@ -13705,7 +13831,7 @@
                   <a:schemeClr val="bg1"/>
                 </a:solidFill>
               </a:rPr>
-              <a:t>Randomly pick k points in the data as centroid points</a:t>
+              <a:t>Randomly pick k points in the data as centroid points.</a:t>
             </a:r>
           </a:p>
           <a:p>
@@ -13715,7 +13841,7 @@
                   <a:schemeClr val="bg1"/>
                 </a:solidFill>
               </a:rPr>
-              <a:t>Assign each non-centroid point to its closest centroid</a:t>
+              <a:t>Assign each non-centroid point to its closest centroid.</a:t>
             </a:r>
           </a:p>
           <a:p>
@@ -13725,7 +13851,7 @@
                   <a:schemeClr val="bg1"/>
                 </a:solidFill>
               </a:rPr>
-              <a:t>Recalculate centroid points by taking the average of all surrounding points assigned to that cluster</a:t>
+              <a:t>Recalculate centroid points by taking the average of all surrounding points assigned to that cluster.</a:t>
             </a:r>
           </a:p>
           <a:p>
@@ -13750,13 +13876,6 @@
               </a:solidFill>
             </a:endParaRPr>
           </a:p>
-          <a:p>
-            <a:endParaRPr lang="en-US" dirty="0">
-              <a:solidFill>
-                <a:schemeClr val="bg1"/>
-              </a:solidFill>
-            </a:endParaRPr>
-          </a:p>
         </p:txBody>
       </p:sp>
       <p:pic>
@@ -13789,6 +13908,62 @@
           </a:prstGeom>
         </p:spPr>
       </p:pic>
+      <p:sp>
+        <p:nvSpPr>
+          <p:cNvPr id="5" name="TextBox 4">
+            <a:extLst>
+              <a:ext uri="{FF2B5EF4-FFF2-40B4-BE49-F238E27FC236}">
+                <a16:creationId xmlns:a16="http://schemas.microsoft.com/office/drawing/2014/main" id="{95A37458-C16C-F798-CB7A-726D52A9D564}"/>
+              </a:ext>
+            </a:extLst>
+          </p:cNvPr>
+          <p:cNvSpPr txBox="1"/>
+          <p:nvPr/>
+        </p:nvSpPr>
+        <p:spPr>
+          <a:xfrm>
+            <a:off x="736980" y="6400800"/>
+            <a:ext cx="10982878" cy="369332"/>
+          </a:xfrm>
+          <a:prstGeom prst="rect">
+            <a:avLst/>
+          </a:prstGeom>
+          <a:noFill/>
+        </p:spPr>
+        <p:txBody>
+          <a:bodyPr wrap="none" rtlCol="0">
+            <a:spAutoFit/>
+          </a:bodyPr>
+          <a:lstStyle/>
+          <a:p>
+            <a:r>
+              <a:rPr lang="en-US" dirty="0"/>
+              <a:t>Good explanation at https://</a:t>
+            </a:r>
+            <a:r>
+              <a:rPr lang="en-US" dirty="0" err="1"/>
+              <a:t>www.youtube.com</a:t>
+            </a:r>
+            <a:r>
+              <a:rPr lang="en-US" dirty="0"/>
+              <a:t>/</a:t>
+            </a:r>
+            <a:r>
+              <a:rPr lang="en-US" dirty="0" err="1"/>
+              <a:t>watch?v</a:t>
+            </a:r>
+            <a:r>
+              <a:rPr lang="en-US" dirty="0"/>
+              <a:t>=hDmNF9JG3lo&amp;ab_channel=</a:t>
+            </a:r>
+            <a:r>
+              <a:rPr lang="en-US" dirty="0" err="1"/>
+              <a:t>ArtificialIntelligence-AllinOne</a:t>
+            </a:r>
+            <a:endParaRPr lang="en-US" dirty="0"/>
+          </a:p>
+        </p:txBody>
+      </p:sp>
     </p:spTree>
     <p:extLst>
       <p:ext uri="{BB962C8B-B14F-4D97-AF65-F5344CB8AC3E}">

</xml_diff>